<commit_message>
reorg, revamp IV section
</commit_message>
<xml_diff>
--- a/analyses/figures/Figure_montaging.pptx
+++ b/analyses/figures/Figure_montaging.pptx
@@ -6,6 +6,7 @@
   </p:sldMasterIdLst>
   <p:sldIdLst>
     <p:sldId id="256" r:id="rId2"/>
+    <p:sldId id="257" r:id="rId3"/>
   </p:sldIdLst>
   <p:sldSz cx="12192000" cy="6858000"/>
   <p:notesSz cx="6858000" cy="9144000"/>
@@ -104,6 +105,11 @@
       </a:defRPr>
     </a:lvl9pPr>
   </p:defaultTextStyle>
+  <p:extLst>
+    <p:ext uri="{EFAFB233-063F-42B5-8137-9DF3F51BA10A}">
+      <p15:sldGuideLst xmlns:p15="http://schemas.microsoft.com/office/powerpoint/2012/main"/>
+    </p:ext>
+  </p:extLst>
 </p:presentation>
 </file>
 
@@ -254,7 +260,7 @@
           <a:p>
             <a:fld id="{542C9660-1722-AD44-BA80-85FEAAF3EA5E}" type="datetimeFigureOut">
               <a:rPr lang="en-US" smtClean="0"/>
-              <a:t>12/9/20</a:t>
+              <a:t>6/11/21</a:t>
             </a:fld>
             <a:endParaRPr lang="en-US"/>
           </a:p>
@@ -452,7 +458,7 @@
           <a:p>
             <a:fld id="{542C9660-1722-AD44-BA80-85FEAAF3EA5E}" type="datetimeFigureOut">
               <a:rPr lang="en-US" smtClean="0"/>
-              <a:t>12/9/20</a:t>
+              <a:t>6/11/21</a:t>
             </a:fld>
             <a:endParaRPr lang="en-US"/>
           </a:p>
@@ -660,7 +666,7 @@
           <a:p>
             <a:fld id="{542C9660-1722-AD44-BA80-85FEAAF3EA5E}" type="datetimeFigureOut">
               <a:rPr lang="en-US" smtClean="0"/>
-              <a:t>12/9/20</a:t>
+              <a:t>6/11/21</a:t>
             </a:fld>
             <a:endParaRPr lang="en-US"/>
           </a:p>
@@ -858,7 +864,7 @@
           <a:p>
             <a:fld id="{542C9660-1722-AD44-BA80-85FEAAF3EA5E}" type="datetimeFigureOut">
               <a:rPr lang="en-US" smtClean="0"/>
-              <a:t>12/9/20</a:t>
+              <a:t>6/11/21</a:t>
             </a:fld>
             <a:endParaRPr lang="en-US"/>
           </a:p>
@@ -1133,7 +1139,7 @@
           <a:p>
             <a:fld id="{542C9660-1722-AD44-BA80-85FEAAF3EA5E}" type="datetimeFigureOut">
               <a:rPr lang="en-US" smtClean="0"/>
-              <a:t>12/9/20</a:t>
+              <a:t>6/11/21</a:t>
             </a:fld>
             <a:endParaRPr lang="en-US"/>
           </a:p>
@@ -1398,7 +1404,7 @@
           <a:p>
             <a:fld id="{542C9660-1722-AD44-BA80-85FEAAF3EA5E}" type="datetimeFigureOut">
               <a:rPr lang="en-US" smtClean="0"/>
-              <a:t>12/9/20</a:t>
+              <a:t>6/11/21</a:t>
             </a:fld>
             <a:endParaRPr lang="en-US"/>
           </a:p>
@@ -1810,7 +1816,7 @@
           <a:p>
             <a:fld id="{542C9660-1722-AD44-BA80-85FEAAF3EA5E}" type="datetimeFigureOut">
               <a:rPr lang="en-US" smtClean="0"/>
-              <a:t>12/9/20</a:t>
+              <a:t>6/11/21</a:t>
             </a:fld>
             <a:endParaRPr lang="en-US"/>
           </a:p>
@@ -1951,7 +1957,7 @@
           <a:p>
             <a:fld id="{542C9660-1722-AD44-BA80-85FEAAF3EA5E}" type="datetimeFigureOut">
               <a:rPr lang="en-US" smtClean="0"/>
-              <a:t>12/9/20</a:t>
+              <a:t>6/11/21</a:t>
             </a:fld>
             <a:endParaRPr lang="en-US"/>
           </a:p>
@@ -2064,7 +2070,7 @@
           <a:p>
             <a:fld id="{542C9660-1722-AD44-BA80-85FEAAF3EA5E}" type="datetimeFigureOut">
               <a:rPr lang="en-US" smtClean="0"/>
-              <a:t>12/9/20</a:t>
+              <a:t>6/11/21</a:t>
             </a:fld>
             <a:endParaRPr lang="en-US"/>
           </a:p>
@@ -2375,7 +2381,7 @@
           <a:p>
             <a:fld id="{542C9660-1722-AD44-BA80-85FEAAF3EA5E}" type="datetimeFigureOut">
               <a:rPr lang="en-US" smtClean="0"/>
-              <a:t>12/9/20</a:t>
+              <a:t>6/11/21</a:t>
             </a:fld>
             <a:endParaRPr lang="en-US"/>
           </a:p>
@@ -2663,7 +2669,7 @@
           <a:p>
             <a:fld id="{542C9660-1722-AD44-BA80-85FEAAF3EA5E}" type="datetimeFigureOut">
               <a:rPr lang="en-US" smtClean="0"/>
-              <a:t>12/9/20</a:t>
+              <a:t>6/11/21</a:t>
             </a:fld>
             <a:endParaRPr lang="en-US"/>
           </a:p>
@@ -2904,7 +2910,7 @@
           <a:p>
             <a:fld id="{542C9660-1722-AD44-BA80-85FEAAF3EA5E}" type="datetimeFigureOut">
               <a:rPr lang="en-US" smtClean="0"/>
-              <a:t>12/9/20</a:t>
+              <a:t>6/11/21</a:t>
             </a:fld>
             <a:endParaRPr lang="en-US"/>
           </a:p>
@@ -3337,9 +3343,8 @@
         </p:nvPicPr>
         <p:blipFill>
           <a:blip r:embed="rId2"/>
-          <a:stretch>
-            <a:fillRect/>
-          </a:stretch>
+          <a:srcRect/>
+          <a:stretch/>
         </p:blipFill>
         <p:spPr>
           <a:xfrm>
@@ -3402,14 +3407,13 @@
         </p:nvPicPr>
         <p:blipFill>
           <a:blip r:embed="rId3"/>
-          <a:stretch>
-            <a:fillRect/>
-          </a:stretch>
+          <a:srcRect/>
+          <a:stretch/>
         </p:blipFill>
         <p:spPr>
           <a:xfrm>
-            <a:off x="5658507" y="342864"/>
-            <a:ext cx="3078892" cy="6157784"/>
+            <a:off x="5618454" y="283779"/>
+            <a:ext cx="3153104" cy="6306207"/>
           </a:xfrm>
           <a:prstGeom prst="rect">
             <a:avLst/>
@@ -3420,6 +3424,129 @@
     <p:extLst>
       <p:ext uri="{BB962C8B-B14F-4D97-AF65-F5344CB8AC3E}">
         <p14:creationId xmlns:p14="http://schemas.microsoft.com/office/powerpoint/2010/main" val="2181150315"/>
+      </p:ext>
+    </p:extLst>
+  </p:cSld>
+  <p:clrMapOvr>
+    <a:masterClrMapping/>
+  </p:clrMapOvr>
+</p:sld>
+</file>
+
+<file path=ppt/slides/slide2.xml><?xml version="1.0" encoding="utf-8"?>
+<p:sld xmlns:a="http://schemas.openxmlformats.org/drawingml/2006/main" xmlns:r="http://schemas.openxmlformats.org/officeDocument/2006/relationships" xmlns:p="http://schemas.openxmlformats.org/presentationml/2006/main">
+  <p:cSld>
+    <p:spTree>
+      <p:nvGrpSpPr>
+        <p:cNvPr id="1" name=""/>
+        <p:cNvGrpSpPr/>
+        <p:nvPr/>
+      </p:nvGrpSpPr>
+      <p:grpSpPr>
+        <a:xfrm>
+          <a:off x="0" y="0"/>
+          <a:ext cx="0" cy="0"/>
+          <a:chOff x="0" y="0"/>
+          <a:chExt cx="0" cy="0"/>
+        </a:xfrm>
+      </p:grpSpPr>
+      <p:pic>
+        <p:nvPicPr>
+          <p:cNvPr id="5" name="Picture 4">
+            <a:extLst>
+              <a:ext uri="{FF2B5EF4-FFF2-40B4-BE49-F238E27FC236}">
+                <a16:creationId xmlns:a16="http://schemas.microsoft.com/office/drawing/2014/main" id="{7551BDCC-0342-9A4C-BE3C-24B737A0C9C6}"/>
+              </a:ext>
+            </a:extLst>
+          </p:cNvPr>
+          <p:cNvPicPr>
+            <a:picLocks noChangeAspect="1"/>
+          </p:cNvPicPr>
+          <p:nvPr/>
+        </p:nvPicPr>
+        <p:blipFill>
+          <a:blip r:embed="rId2"/>
+          <a:srcRect/>
+          <a:stretch/>
+        </p:blipFill>
+        <p:spPr>
+          <a:xfrm>
+            <a:off x="588580" y="210206"/>
+            <a:ext cx="3421118" cy="4887312"/>
+          </a:xfrm>
+          <a:prstGeom prst="rect">
+            <a:avLst/>
+          </a:prstGeom>
+        </p:spPr>
+      </p:pic>
+      <p:sp>
+        <p:nvSpPr>
+          <p:cNvPr id="8" name="TextBox 7">
+            <a:extLst>
+              <a:ext uri="{FF2B5EF4-FFF2-40B4-BE49-F238E27FC236}">
+                <a16:creationId xmlns:a16="http://schemas.microsoft.com/office/drawing/2014/main" id="{6ABAC15A-E604-704D-BFBC-719BAEA1FE2B}"/>
+              </a:ext>
+            </a:extLst>
+          </p:cNvPr>
+          <p:cNvSpPr txBox="1"/>
+          <p:nvPr/>
+        </p:nvSpPr>
+        <p:spPr>
+          <a:xfrm>
+            <a:off x="1103586" y="521541"/>
+            <a:ext cx="370614" cy="307777"/>
+          </a:xfrm>
+          <a:prstGeom prst="rect">
+            <a:avLst/>
+          </a:prstGeom>
+          <a:noFill/>
+        </p:spPr>
+        <p:txBody>
+          <a:bodyPr wrap="square" rtlCol="0">
+            <a:spAutoFit/>
+          </a:bodyPr>
+          <a:lstStyle/>
+          <a:p>
+            <a:r>
+              <a:rPr lang="en-US" sz="1400" b="1" dirty="0"/>
+              <a:t>A</a:t>
+            </a:r>
+          </a:p>
+        </p:txBody>
+      </p:sp>
+      <p:pic>
+        <p:nvPicPr>
+          <p:cNvPr id="10" name="Picture 9">
+            <a:extLst>
+              <a:ext uri="{FF2B5EF4-FFF2-40B4-BE49-F238E27FC236}">
+                <a16:creationId xmlns:a16="http://schemas.microsoft.com/office/drawing/2014/main" id="{1008F45D-ACE2-E947-BBE5-D7D75C4E9448}"/>
+              </a:ext>
+            </a:extLst>
+          </p:cNvPr>
+          <p:cNvPicPr>
+            <a:picLocks noChangeAspect="1"/>
+          </p:cNvPicPr>
+          <p:nvPr/>
+        </p:nvPicPr>
+        <p:blipFill>
+          <a:blip r:embed="rId3"/>
+          <a:srcRect/>
+          <a:stretch/>
+        </p:blipFill>
+        <p:spPr>
+          <a:xfrm>
+            <a:off x="4009699" y="521541"/>
+            <a:ext cx="3163614" cy="3163614"/>
+          </a:xfrm>
+          <a:prstGeom prst="rect">
+            <a:avLst/>
+          </a:prstGeom>
+        </p:spPr>
+      </p:pic>
+    </p:spTree>
+    <p:extLst>
+      <p:ext uri="{BB962C8B-B14F-4D97-AF65-F5344CB8AC3E}">
+        <p14:creationId xmlns:p14="http://schemas.microsoft.com/office/powerpoint/2010/main" val="2622446870"/>
       </p:ext>
     </p:extLst>
   </p:cSld>

</xml_diff>